<commit_message>
new files and function finished
</commit_message>
<xml_diff>
--- a/Curso/week_10/day3/theory/Machine Learning - Summary Supervised Learning.pptx
+++ b/Curso/week_10/day3/theory/Machine Learning - Summary Supervised Learning.pptx
@@ -230,7 +230,7 @@
           <a:p>
             <a:fld id="{CBC3D06E-D880-4630-85C6-508F7CA16EC0}" type="datetimeFigureOut">
               <a:rPr lang="es-ES" smtClean="0"/>
-              <a:t>15/09/2020</a:t>
+              <a:t>16/09/2020</a:t>
             </a:fld>
             <a:endParaRPr lang="es-ES"/>
           </a:p>
@@ -1862,7 +1862,7 @@
             <a:fld id="{1E700B27-DE4C-4B9E-BB11-B9027034A00F}" type="datetimeFigureOut">
               <a:rPr lang="en-US" smtClean="0"/>
               <a:pPr/>
-              <a:t>9/15/2020</a:t>
+              <a:t>9/16/2020</a:t>
             </a:fld>
             <a:endParaRPr lang="en-US" dirty="0"/>
           </a:p>
@@ -2033,7 +2033,7 @@
           <a:p>
             <a:fld id="{80DBE609-F3F2-45E6-BD6A-E03A8C86C1AE}" type="datetimeFigureOut">
               <a:rPr lang="en-US" smtClean="0"/>
-              <a:t>9/15/2020</a:t>
+              <a:t>9/16/2020</a:t>
             </a:fld>
             <a:endParaRPr lang="en-US" dirty="0"/>
           </a:p>
@@ -2214,7 +2214,7 @@
           <a:p>
             <a:fld id="{7A24AD68-089C-4467-A8F3-EA2BBCA6B44E}" type="datetimeFigureOut">
               <a:rPr lang="en-US" smtClean="0"/>
-              <a:t>9/15/2020</a:t>
+              <a:t>9/16/2020</a:t>
             </a:fld>
             <a:endParaRPr lang="en-US" dirty="0"/>
           </a:p>
@@ -2385,7 +2385,7 @@
           <a:p>
             <a:fld id="{75C51FCE-E4BB-4680-8E50-3C0E348D2609}" type="datetimeFigureOut">
               <a:rPr lang="en-US" smtClean="0"/>
-              <a:t>9/15/2020</a:t>
+              <a:t>9/16/2020</a:t>
             </a:fld>
             <a:endParaRPr lang="en-US" dirty="0"/>
           </a:p>
@@ -2632,7 +2632,7 @@
           <a:p>
             <a:fld id="{8AAA073D-A903-47F8-8D16-77642FB0DF1F}" type="datetimeFigureOut">
               <a:rPr lang="en-US" smtClean="0"/>
-              <a:t>9/15/2020</a:t>
+              <a:t>9/16/2020</a:t>
             </a:fld>
             <a:endParaRPr lang="en-US" dirty="0"/>
           </a:p>
@@ -2865,7 +2865,7 @@
           <a:p>
             <a:fld id="{AB91FA40-626B-4CA1-85D0-7A9016E395BA}" type="datetimeFigureOut">
               <a:rPr lang="en-US" smtClean="0"/>
-              <a:t>9/15/2020</a:t>
+              <a:t>9/16/2020</a:t>
             </a:fld>
             <a:endParaRPr lang="en-US" dirty="0"/>
           </a:p>
@@ -3233,7 +3233,7 @@
           <a:p>
             <a:fld id="{C3F425EA-B9DC-48A7-991E-9A82573B1B21}" type="datetimeFigureOut">
               <a:rPr lang="en-US" smtClean="0"/>
-              <a:t>9/15/2020</a:t>
+              <a:t>9/16/2020</a:t>
             </a:fld>
             <a:endParaRPr lang="en-US" dirty="0"/>
           </a:p>
@@ -3352,7 +3352,7 @@
           <a:p>
             <a:fld id="{66CB97F8-6CEB-469B-AFCC-889F2A2B1D5A}" type="datetimeFigureOut">
               <a:rPr lang="en-US" smtClean="0"/>
-              <a:t>9/15/2020</a:t>
+              <a:t>9/16/2020</a:t>
             </a:fld>
             <a:endParaRPr lang="en-US" dirty="0"/>
           </a:p>
@@ -3448,7 +3448,7 @@
           <a:p>
             <a:fld id="{8FA9179F-009E-4FA5-B091-7EBB82A185BD}" type="datetimeFigureOut">
               <a:rPr lang="en-US" smtClean="0"/>
-              <a:t>9/15/2020</a:t>
+              <a:t>9/16/2020</a:t>
             </a:fld>
             <a:endParaRPr lang="en-US" dirty="0"/>
           </a:p>
@@ -3726,7 +3726,7 @@
           <a:p>
             <a:fld id="{8E665CEB-0076-4E37-B880-BCEA9784DE0A}" type="datetimeFigureOut">
               <a:rPr lang="en-US" smtClean="0"/>
-              <a:t>9/15/2020</a:t>
+              <a:t>9/16/2020</a:t>
             </a:fld>
             <a:endParaRPr lang="en-US" dirty="0"/>
           </a:p>
@@ -3984,7 +3984,7 @@
           <a:p>
             <a:fld id="{A6149E5E-3896-4118-99A7-7B85668F1C5E}" type="datetimeFigureOut">
               <a:rPr lang="en-US" smtClean="0"/>
-              <a:t>9/15/2020</a:t>
+              <a:t>9/16/2020</a:t>
             </a:fld>
             <a:endParaRPr lang="en-US" dirty="0"/>
           </a:p>
@@ -4198,7 +4198,7 @@
           <a:p>
             <a:fld id="{7E0D914D-B099-4142-A885-11F276715148}" type="datetimeFigureOut">
               <a:rPr lang="en-US" smtClean="0"/>
-              <a:t>9/15/2020</a:t>
+              <a:t>9/16/2020</a:t>
             </a:fld>
             <a:endParaRPr lang="en-US" dirty="0"/>
           </a:p>
@@ -4646,7 +4646,7 @@
                   <a:srgbClr val="FF0000"/>
                 </a:solidFill>
               </a:rPr>
-              <a:t>Unsupervised</a:t>
+              <a:t>Supervised</a:t>
             </a:r>
             <a:r>
               <a:rPr lang="es-ES" dirty="0">
@@ -4654,8 +4654,21 @@
                   <a:srgbClr val="FF0000"/>
                 </a:solidFill>
               </a:rPr>
-              <a:t> Learning</a:t>
-            </a:r>
+              <a:t> Learning </a:t>
+            </a:r>
+            <a:r>
+              <a:rPr lang="es-ES" dirty="0" err="1">
+                <a:solidFill>
+                  <a:srgbClr val="FF0000"/>
+                </a:solidFill>
+              </a:rPr>
+              <a:t>Summary</a:t>
+            </a:r>
+            <a:endParaRPr lang="es-ES" dirty="0">
+              <a:solidFill>
+                <a:srgbClr val="FF0000"/>
+              </a:solidFill>
+            </a:endParaRPr>
           </a:p>
         </p:txBody>
       </p:sp>

</xml_diff>